<commit_message>
o done with ppt
</commit_message>
<xml_diff>
--- a/Project/Demore_CSCE623Proj.pptx
+++ b/Project/Demore_CSCE623Proj.pptx
@@ -4,12 +4,19 @@
   <p:sldMasterIdLst>
     <p:sldMasterId id="2147483648" r:id="rId1"/>
   </p:sldMasterIdLst>
+  <p:notesMasterIdLst>
+    <p:notesMasterId r:id="rId11"/>
+  </p:notesMasterIdLst>
   <p:sldIdLst>
     <p:sldId id="256" r:id="rId2"/>
     <p:sldId id="257" r:id="rId3"/>
     <p:sldId id="258" r:id="rId4"/>
     <p:sldId id="259" r:id="rId5"/>
     <p:sldId id="260" r:id="rId6"/>
+    <p:sldId id="261" r:id="rId7"/>
+    <p:sldId id="262" r:id="rId8"/>
+    <p:sldId id="263" r:id="rId9"/>
+    <p:sldId id="264" r:id="rId10"/>
   </p:sldIdLst>
   <p:sldSz cx="12192000" cy="6858000"/>
   <p:notesSz cx="6858000" cy="9144000"/>
@@ -116,6 +123,559 @@
 </p:presentation>
 </file>
 
+<file path=ppt/commentAuthors.xml><?xml version="1.0" encoding="utf-8"?>
+<p:cmAuthorLst xmlns:a="http://schemas.openxmlformats.org/drawingml/2006/main" xmlns:r="http://schemas.openxmlformats.org/officeDocument/2006/relationships" xmlns:p="http://schemas.openxmlformats.org/presentationml/2006/main">
+  <p:cmAuthor id="1" name="Mark Demore" initials="MD" lastIdx="1" clrIdx="0">
+    <p:extLst>
+      <p:ext uri="{19B8F6BF-5375-455C-9EA6-DF929625EA0E}">
+        <p15:presenceInfo xmlns:p15="http://schemas.microsoft.com/office/powerpoint/2012/main" userId="4329c568d277fcde" providerId="Windows Live"/>
+      </p:ext>
+    </p:extLst>
+  </p:cmAuthor>
+</p:cmAuthorLst>
+</file>
+
+<file path=ppt/notesMasters/notesMaster1.xml><?xml version="1.0" encoding="utf-8"?>
+<p:notesMaster xmlns:a="http://schemas.openxmlformats.org/drawingml/2006/main" xmlns:r="http://schemas.openxmlformats.org/officeDocument/2006/relationships" xmlns:p="http://schemas.openxmlformats.org/presentationml/2006/main">
+  <p:cSld>
+    <p:bg>
+      <p:bgRef idx="1001">
+        <a:schemeClr val="bg1"/>
+      </p:bgRef>
+    </p:bg>
+    <p:spTree>
+      <p:nvGrpSpPr>
+        <p:cNvPr id="1" name=""/>
+        <p:cNvGrpSpPr/>
+        <p:nvPr/>
+      </p:nvGrpSpPr>
+      <p:grpSpPr>
+        <a:xfrm>
+          <a:off x="0" y="0"/>
+          <a:ext cx="0" cy="0"/>
+          <a:chOff x="0" y="0"/>
+          <a:chExt cx="0" cy="0"/>
+        </a:xfrm>
+      </p:grpSpPr>
+      <p:sp>
+        <p:nvSpPr>
+          <p:cNvPr id="2" name="Header Placeholder 1"/>
+          <p:cNvSpPr>
+            <a:spLocks noGrp="1"/>
+          </p:cNvSpPr>
+          <p:nvPr>
+            <p:ph type="hdr" sz="quarter"/>
+          </p:nvPr>
+        </p:nvSpPr>
+        <p:spPr>
+          <a:xfrm>
+            <a:off x="0" y="0"/>
+            <a:ext cx="2971800" cy="458788"/>
+          </a:xfrm>
+          <a:prstGeom prst="rect">
+            <a:avLst/>
+          </a:prstGeom>
+        </p:spPr>
+        <p:txBody>
+          <a:bodyPr vert="horz" lIns="91440" tIns="45720" rIns="91440" bIns="45720" rtlCol="0"/>
+          <a:lstStyle>
+            <a:lvl1pPr algn="l">
+              <a:defRPr sz="1200"/>
+            </a:lvl1pPr>
+          </a:lstStyle>
+          <a:p>
+            <a:endParaRPr lang="en-US"/>
+          </a:p>
+        </p:txBody>
+      </p:sp>
+      <p:sp>
+        <p:nvSpPr>
+          <p:cNvPr id="3" name="Date Placeholder 2"/>
+          <p:cNvSpPr>
+            <a:spLocks noGrp="1"/>
+          </p:cNvSpPr>
+          <p:nvPr>
+            <p:ph type="dt" idx="1"/>
+          </p:nvPr>
+        </p:nvSpPr>
+        <p:spPr>
+          <a:xfrm>
+            <a:off x="3884613" y="0"/>
+            <a:ext cx="2971800" cy="458788"/>
+          </a:xfrm>
+          <a:prstGeom prst="rect">
+            <a:avLst/>
+          </a:prstGeom>
+        </p:spPr>
+        <p:txBody>
+          <a:bodyPr vert="horz" lIns="91440" tIns="45720" rIns="91440" bIns="45720" rtlCol="0"/>
+          <a:lstStyle>
+            <a:lvl1pPr algn="r">
+              <a:defRPr sz="1200"/>
+            </a:lvl1pPr>
+          </a:lstStyle>
+          <a:p>
+            <a:fld id="{2B162E96-F7E4-4F72-B193-8E6291BA96EB}" type="datetimeFigureOut">
+              <a:rPr lang="en-US" smtClean="0"/>
+              <a:t>6/18/2020</a:t>
+            </a:fld>
+            <a:endParaRPr lang="en-US"/>
+          </a:p>
+        </p:txBody>
+      </p:sp>
+      <p:sp>
+        <p:nvSpPr>
+          <p:cNvPr id="4" name="Slide Image Placeholder 3"/>
+          <p:cNvSpPr>
+            <a:spLocks noGrp="1" noRot="1" noChangeAspect="1"/>
+          </p:cNvSpPr>
+          <p:nvPr>
+            <p:ph type="sldImg" idx="2"/>
+          </p:nvPr>
+        </p:nvSpPr>
+        <p:spPr>
+          <a:xfrm>
+            <a:off x="685800" y="1143000"/>
+            <a:ext cx="5486400" cy="3086100"/>
+          </a:xfrm>
+          <a:prstGeom prst="rect">
+            <a:avLst/>
+          </a:prstGeom>
+          <a:noFill/>
+          <a:ln w="12700">
+            <a:solidFill>
+              <a:prstClr val="black"/>
+            </a:solidFill>
+          </a:ln>
+        </p:spPr>
+        <p:txBody>
+          <a:bodyPr vert="horz" lIns="91440" tIns="45720" rIns="91440" bIns="45720" rtlCol="0" anchor="ctr"/>
+          <a:lstStyle/>
+          <a:p>
+            <a:endParaRPr lang="en-US"/>
+          </a:p>
+        </p:txBody>
+      </p:sp>
+      <p:sp>
+        <p:nvSpPr>
+          <p:cNvPr id="5" name="Notes Placeholder 4"/>
+          <p:cNvSpPr>
+            <a:spLocks noGrp="1"/>
+          </p:cNvSpPr>
+          <p:nvPr>
+            <p:ph type="body" sz="quarter" idx="3"/>
+          </p:nvPr>
+        </p:nvSpPr>
+        <p:spPr>
+          <a:xfrm>
+            <a:off x="685800" y="4400550"/>
+            <a:ext cx="5486400" cy="3600450"/>
+          </a:xfrm>
+          <a:prstGeom prst="rect">
+            <a:avLst/>
+          </a:prstGeom>
+        </p:spPr>
+        <p:txBody>
+          <a:bodyPr vert="horz" lIns="91440" tIns="45720" rIns="91440" bIns="45720" rtlCol="0"/>
+          <a:lstStyle/>
+          <a:p>
+            <a:pPr lvl="0"/>
+            <a:r>
+              <a:rPr lang="en-US"/>
+              <a:t>Click to edit Master text styles</a:t>
+            </a:r>
+          </a:p>
+          <a:p>
+            <a:pPr lvl="1"/>
+            <a:r>
+              <a:rPr lang="en-US"/>
+              <a:t>Second level</a:t>
+            </a:r>
+          </a:p>
+          <a:p>
+            <a:pPr lvl="2"/>
+            <a:r>
+              <a:rPr lang="en-US"/>
+              <a:t>Third level</a:t>
+            </a:r>
+          </a:p>
+          <a:p>
+            <a:pPr lvl="3"/>
+            <a:r>
+              <a:rPr lang="en-US"/>
+              <a:t>Fourth level</a:t>
+            </a:r>
+          </a:p>
+          <a:p>
+            <a:pPr lvl="4"/>
+            <a:r>
+              <a:rPr lang="en-US"/>
+              <a:t>Fifth level</a:t>
+            </a:r>
+          </a:p>
+        </p:txBody>
+      </p:sp>
+      <p:sp>
+        <p:nvSpPr>
+          <p:cNvPr id="6" name="Footer Placeholder 5"/>
+          <p:cNvSpPr>
+            <a:spLocks noGrp="1"/>
+          </p:cNvSpPr>
+          <p:nvPr>
+            <p:ph type="ftr" sz="quarter" idx="4"/>
+          </p:nvPr>
+        </p:nvSpPr>
+        <p:spPr>
+          <a:xfrm>
+            <a:off x="0" y="8685213"/>
+            <a:ext cx="2971800" cy="458787"/>
+          </a:xfrm>
+          <a:prstGeom prst="rect">
+            <a:avLst/>
+          </a:prstGeom>
+        </p:spPr>
+        <p:txBody>
+          <a:bodyPr vert="horz" lIns="91440" tIns="45720" rIns="91440" bIns="45720" rtlCol="0" anchor="b"/>
+          <a:lstStyle>
+            <a:lvl1pPr algn="l">
+              <a:defRPr sz="1200"/>
+            </a:lvl1pPr>
+          </a:lstStyle>
+          <a:p>
+            <a:endParaRPr lang="en-US"/>
+          </a:p>
+        </p:txBody>
+      </p:sp>
+      <p:sp>
+        <p:nvSpPr>
+          <p:cNvPr id="7" name="Slide Number Placeholder 6"/>
+          <p:cNvSpPr>
+            <a:spLocks noGrp="1"/>
+          </p:cNvSpPr>
+          <p:nvPr>
+            <p:ph type="sldNum" sz="quarter" idx="5"/>
+          </p:nvPr>
+        </p:nvSpPr>
+        <p:spPr>
+          <a:xfrm>
+            <a:off x="3884613" y="8685213"/>
+            <a:ext cx="2971800" cy="458787"/>
+          </a:xfrm>
+          <a:prstGeom prst="rect">
+            <a:avLst/>
+          </a:prstGeom>
+        </p:spPr>
+        <p:txBody>
+          <a:bodyPr vert="horz" lIns="91440" tIns="45720" rIns="91440" bIns="45720" rtlCol="0" anchor="b"/>
+          <a:lstStyle>
+            <a:lvl1pPr algn="r">
+              <a:defRPr sz="1200"/>
+            </a:lvl1pPr>
+          </a:lstStyle>
+          <a:p>
+            <a:fld id="{1E2A2E83-CCAB-4427-8D83-422F6C6AF64E}" type="slidenum">
+              <a:rPr lang="en-US" smtClean="0"/>
+              <a:t>‹#›</a:t>
+            </a:fld>
+            <a:endParaRPr lang="en-US"/>
+          </a:p>
+        </p:txBody>
+      </p:sp>
+    </p:spTree>
+    <p:extLst>
+      <p:ext uri="{BB962C8B-B14F-4D97-AF65-F5344CB8AC3E}">
+        <p14:creationId xmlns:p14="http://schemas.microsoft.com/office/powerpoint/2010/main" val="649259231"/>
+      </p:ext>
+    </p:extLst>
+  </p:cSld>
+  <p:clrMap bg1="lt1" tx1="dk1" bg2="lt2" tx2="dk2" accent1="accent1" accent2="accent2" accent3="accent3" accent4="accent4" accent5="accent5" accent6="accent6" hlink="hlink" folHlink="folHlink"/>
+  <p:notesStyle>
+    <a:lvl1pPr marL="0" algn="l" defTabSz="914400" rtl="0" eaLnBrk="1" latinLnBrk="0" hangingPunct="1">
+      <a:defRPr sz="1200" kern="1200">
+        <a:solidFill>
+          <a:schemeClr val="tx1"/>
+        </a:solidFill>
+        <a:latin typeface="+mn-lt"/>
+        <a:ea typeface="+mn-ea"/>
+        <a:cs typeface="+mn-cs"/>
+      </a:defRPr>
+    </a:lvl1pPr>
+    <a:lvl2pPr marL="457200" algn="l" defTabSz="914400" rtl="0" eaLnBrk="1" latinLnBrk="0" hangingPunct="1">
+      <a:defRPr sz="1200" kern="1200">
+        <a:solidFill>
+          <a:schemeClr val="tx1"/>
+        </a:solidFill>
+        <a:latin typeface="+mn-lt"/>
+        <a:ea typeface="+mn-ea"/>
+        <a:cs typeface="+mn-cs"/>
+      </a:defRPr>
+    </a:lvl2pPr>
+    <a:lvl3pPr marL="914400" algn="l" defTabSz="914400" rtl="0" eaLnBrk="1" latinLnBrk="0" hangingPunct="1">
+      <a:defRPr sz="1200" kern="1200">
+        <a:solidFill>
+          <a:schemeClr val="tx1"/>
+        </a:solidFill>
+        <a:latin typeface="+mn-lt"/>
+        <a:ea typeface="+mn-ea"/>
+        <a:cs typeface="+mn-cs"/>
+      </a:defRPr>
+    </a:lvl3pPr>
+    <a:lvl4pPr marL="1371600" algn="l" defTabSz="914400" rtl="0" eaLnBrk="1" latinLnBrk="0" hangingPunct="1">
+      <a:defRPr sz="1200" kern="1200">
+        <a:solidFill>
+          <a:schemeClr val="tx1"/>
+        </a:solidFill>
+        <a:latin typeface="+mn-lt"/>
+        <a:ea typeface="+mn-ea"/>
+        <a:cs typeface="+mn-cs"/>
+      </a:defRPr>
+    </a:lvl4pPr>
+    <a:lvl5pPr marL="1828800" algn="l" defTabSz="914400" rtl="0" eaLnBrk="1" latinLnBrk="0" hangingPunct="1">
+      <a:defRPr sz="1200" kern="1200">
+        <a:solidFill>
+          <a:schemeClr val="tx1"/>
+        </a:solidFill>
+        <a:latin typeface="+mn-lt"/>
+        <a:ea typeface="+mn-ea"/>
+        <a:cs typeface="+mn-cs"/>
+      </a:defRPr>
+    </a:lvl5pPr>
+    <a:lvl6pPr marL="2286000" algn="l" defTabSz="914400" rtl="0" eaLnBrk="1" latinLnBrk="0" hangingPunct="1">
+      <a:defRPr sz="1200" kern="1200">
+        <a:solidFill>
+          <a:schemeClr val="tx1"/>
+        </a:solidFill>
+        <a:latin typeface="+mn-lt"/>
+        <a:ea typeface="+mn-ea"/>
+        <a:cs typeface="+mn-cs"/>
+      </a:defRPr>
+    </a:lvl6pPr>
+    <a:lvl7pPr marL="2743200" algn="l" defTabSz="914400" rtl="0" eaLnBrk="1" latinLnBrk="0" hangingPunct="1">
+      <a:defRPr sz="1200" kern="1200">
+        <a:solidFill>
+          <a:schemeClr val="tx1"/>
+        </a:solidFill>
+        <a:latin typeface="+mn-lt"/>
+        <a:ea typeface="+mn-ea"/>
+        <a:cs typeface="+mn-cs"/>
+      </a:defRPr>
+    </a:lvl7pPr>
+    <a:lvl8pPr marL="3200400" algn="l" defTabSz="914400" rtl="0" eaLnBrk="1" latinLnBrk="0" hangingPunct="1">
+      <a:defRPr sz="1200" kern="1200">
+        <a:solidFill>
+          <a:schemeClr val="tx1"/>
+        </a:solidFill>
+        <a:latin typeface="+mn-lt"/>
+        <a:ea typeface="+mn-ea"/>
+        <a:cs typeface="+mn-cs"/>
+      </a:defRPr>
+    </a:lvl8pPr>
+    <a:lvl9pPr marL="3657600" algn="l" defTabSz="914400" rtl="0" eaLnBrk="1" latinLnBrk="0" hangingPunct="1">
+      <a:defRPr sz="1200" kern="1200">
+        <a:solidFill>
+          <a:schemeClr val="tx1"/>
+        </a:solidFill>
+        <a:latin typeface="+mn-lt"/>
+        <a:ea typeface="+mn-ea"/>
+        <a:cs typeface="+mn-cs"/>
+      </a:defRPr>
+    </a:lvl9pPr>
+  </p:notesStyle>
+</p:notesMaster>
+</file>
+
+<file path=ppt/notesSlides/notesSlide1.xml><?xml version="1.0" encoding="utf-8"?>
+<p:notes xmlns:a="http://schemas.openxmlformats.org/drawingml/2006/main" xmlns:r="http://schemas.openxmlformats.org/officeDocument/2006/relationships" xmlns:p="http://schemas.openxmlformats.org/presentationml/2006/main">
+  <p:cSld>
+    <p:spTree>
+      <p:nvGrpSpPr>
+        <p:cNvPr id="1" name=""/>
+        <p:cNvGrpSpPr/>
+        <p:nvPr/>
+      </p:nvGrpSpPr>
+      <p:grpSpPr>
+        <a:xfrm>
+          <a:off x="0" y="0"/>
+          <a:ext cx="0" cy="0"/>
+          <a:chOff x="0" y="0"/>
+          <a:chExt cx="0" cy="0"/>
+        </a:xfrm>
+      </p:grpSpPr>
+      <p:sp>
+        <p:nvSpPr>
+          <p:cNvPr id="2" name="Slide Image Placeholder 1"/>
+          <p:cNvSpPr>
+            <a:spLocks noGrp="1" noRot="1" noChangeAspect="1"/>
+          </p:cNvSpPr>
+          <p:nvPr>
+            <p:ph type="sldImg"/>
+          </p:nvPr>
+        </p:nvSpPr>
+        <p:spPr/>
+      </p:sp>
+      <p:sp>
+        <p:nvSpPr>
+          <p:cNvPr id="3" name="Notes Placeholder 2"/>
+          <p:cNvSpPr>
+            <a:spLocks noGrp="1"/>
+          </p:cNvSpPr>
+          <p:nvPr>
+            <p:ph type="body" idx="1"/>
+          </p:nvPr>
+        </p:nvSpPr>
+        <p:spPr/>
+        <p:txBody>
+          <a:bodyPr/>
+          <a:lstStyle/>
+          <a:p>
+            <a:r>
+              <a:rPr lang="en-US" dirty="0"/>
+              <a:t>False positive better than false negative</a:t>
+            </a:r>
+          </a:p>
+        </p:txBody>
+      </p:sp>
+      <p:sp>
+        <p:nvSpPr>
+          <p:cNvPr id="4" name="Slide Number Placeholder 3"/>
+          <p:cNvSpPr>
+            <a:spLocks noGrp="1"/>
+          </p:cNvSpPr>
+          <p:nvPr>
+            <p:ph type="sldNum" sz="quarter" idx="5"/>
+          </p:nvPr>
+        </p:nvSpPr>
+        <p:spPr/>
+        <p:txBody>
+          <a:bodyPr/>
+          <a:lstStyle/>
+          <a:p>
+            <a:fld id="{1E2A2E83-CCAB-4427-8D83-422F6C6AF64E}" type="slidenum">
+              <a:rPr lang="en-US" smtClean="0"/>
+              <a:t>4</a:t>
+            </a:fld>
+            <a:endParaRPr lang="en-US"/>
+          </a:p>
+        </p:txBody>
+      </p:sp>
+    </p:spTree>
+    <p:extLst>
+      <p:ext uri="{BB962C8B-B14F-4D97-AF65-F5344CB8AC3E}">
+        <p14:creationId xmlns:p14="http://schemas.microsoft.com/office/powerpoint/2010/main" val="3061311240"/>
+      </p:ext>
+    </p:extLst>
+  </p:cSld>
+  <p:clrMapOvr>
+    <a:masterClrMapping/>
+  </p:clrMapOvr>
+</p:notes>
+</file>
+
+<file path=ppt/notesSlides/notesSlide2.xml><?xml version="1.0" encoding="utf-8"?>
+<p:notes xmlns:a="http://schemas.openxmlformats.org/drawingml/2006/main" xmlns:r="http://schemas.openxmlformats.org/officeDocument/2006/relationships" xmlns:p="http://schemas.openxmlformats.org/presentationml/2006/main">
+  <p:cSld>
+    <p:spTree>
+      <p:nvGrpSpPr>
+        <p:cNvPr id="1" name=""/>
+        <p:cNvGrpSpPr/>
+        <p:nvPr/>
+      </p:nvGrpSpPr>
+      <p:grpSpPr>
+        <a:xfrm>
+          <a:off x="0" y="0"/>
+          <a:ext cx="0" cy="0"/>
+          <a:chOff x="0" y="0"/>
+          <a:chExt cx="0" cy="0"/>
+        </a:xfrm>
+      </p:grpSpPr>
+      <p:sp>
+        <p:nvSpPr>
+          <p:cNvPr id="2" name="Slide Image Placeholder 1"/>
+          <p:cNvSpPr>
+            <a:spLocks noGrp="1" noRot="1" noChangeAspect="1"/>
+          </p:cNvSpPr>
+          <p:nvPr>
+            <p:ph type="sldImg"/>
+          </p:nvPr>
+        </p:nvSpPr>
+        <p:spPr/>
+      </p:sp>
+      <p:sp>
+        <p:nvSpPr>
+          <p:cNvPr id="3" name="Notes Placeholder 2"/>
+          <p:cNvSpPr>
+            <a:spLocks noGrp="1"/>
+          </p:cNvSpPr>
+          <p:nvPr>
+            <p:ph type="body" idx="1"/>
+          </p:nvPr>
+        </p:nvSpPr>
+        <p:spPr/>
+        <p:txBody>
+          <a:bodyPr/>
+          <a:lstStyle/>
+          <a:p>
+            <a:r>
+              <a:rPr lang="en-US" dirty="0" err="1"/>
+              <a:t>Downsample</a:t>
+            </a:r>
+            <a:r>
+              <a:rPr lang="en-US" dirty="0"/>
+              <a:t> so each </a:t>
+            </a:r>
+            <a:r>
+              <a:rPr lang="en-US" dirty="0" err="1"/>
+              <a:t>obs</a:t>
+            </a:r>
+            <a:r>
+              <a:rPr lang="en-US" dirty="0"/>
+              <a:t> is avg of 3 sec</a:t>
+            </a:r>
+          </a:p>
+          <a:p>
+            <a:r>
+              <a:rPr lang="en-US" dirty="0"/>
+              <a:t>Scale between 0,1</a:t>
+            </a:r>
+          </a:p>
+        </p:txBody>
+      </p:sp>
+      <p:sp>
+        <p:nvSpPr>
+          <p:cNvPr id="4" name="Slide Number Placeholder 3"/>
+          <p:cNvSpPr>
+            <a:spLocks noGrp="1"/>
+          </p:cNvSpPr>
+          <p:nvPr>
+            <p:ph type="sldNum" sz="quarter" idx="5"/>
+          </p:nvPr>
+        </p:nvSpPr>
+        <p:spPr/>
+        <p:txBody>
+          <a:bodyPr/>
+          <a:lstStyle/>
+          <a:p>
+            <a:fld id="{1E2A2E83-CCAB-4427-8D83-422F6C6AF64E}" type="slidenum">
+              <a:rPr lang="en-US" smtClean="0"/>
+              <a:t>5</a:t>
+            </a:fld>
+            <a:endParaRPr lang="en-US"/>
+          </a:p>
+        </p:txBody>
+      </p:sp>
+    </p:spTree>
+    <p:extLst>
+      <p:ext uri="{BB962C8B-B14F-4D97-AF65-F5344CB8AC3E}">
+        <p14:creationId xmlns:p14="http://schemas.microsoft.com/office/powerpoint/2010/main" val="956319788"/>
+      </p:ext>
+    </p:extLst>
+  </p:cSld>
+  <p:clrMapOvr>
+    <a:masterClrMapping/>
+  </p:clrMapOvr>
+</p:notes>
+</file>
+
 <file path=ppt/slideLayouts/slideLayout1.xml><?xml version="1.0" encoding="utf-8"?>
 <p:sldLayout xmlns:a="http://schemas.openxmlformats.org/drawingml/2006/main" xmlns:r="http://schemas.openxmlformats.org/officeDocument/2006/relationships" xmlns:p="http://schemas.openxmlformats.org/presentationml/2006/main" type="title" preserve="1">
   <p:cSld name="Title Slide">
@@ -681,7 +1241,7 @@
           <a:p>
             <a:fld id="{AB8D34D5-F463-4000-9075-ABAEA5C4102B}" type="datetimeFigureOut">
               <a:rPr lang="en-US" smtClean="0"/>
-              <a:t>6/17/2020</a:t>
+              <a:t>6/18/2020</a:t>
             </a:fld>
             <a:endParaRPr lang="en-US"/>
           </a:p>
@@ -1273,7 +1833,7 @@
             <a:fld id="{AB8D34D5-F463-4000-9075-ABAEA5C4102B}" type="datetimeFigureOut">
               <a:rPr lang="en-US" smtClean="0"/>
               <a:pPr/>
-              <a:t>6/17/2020</a:t>
+              <a:t>6/18/2020</a:t>
             </a:fld>
             <a:endParaRPr lang="en-US"/>
           </a:p>
@@ -1488,7 +2048,7 @@
           <a:p>
             <a:fld id="{AB8D34D5-F463-4000-9075-ABAEA5C4102B}" type="datetimeFigureOut">
               <a:rPr lang="en-US" smtClean="0"/>
-              <a:t>6/17/2020</a:t>
+              <a:t>6/18/2020</a:t>
             </a:fld>
             <a:endParaRPr lang="en-US"/>
           </a:p>
@@ -1770,7 +2330,7 @@
           <a:p>
             <a:fld id="{AB8D34D5-F463-4000-9075-ABAEA5C4102B}" type="datetimeFigureOut">
               <a:rPr lang="en-US" smtClean="0"/>
-              <a:t>6/17/2020</a:t>
+              <a:t>6/18/2020</a:t>
             </a:fld>
             <a:endParaRPr lang="en-US"/>
           </a:p>
@@ -2035,7 +2595,7 @@
           <a:p>
             <a:fld id="{AB8D34D5-F463-4000-9075-ABAEA5C4102B}" type="datetimeFigureOut">
               <a:rPr lang="en-US" smtClean="0"/>
-              <a:t>6/17/2020</a:t>
+              <a:t>6/18/2020</a:t>
             </a:fld>
             <a:endParaRPr lang="en-US"/>
           </a:p>
@@ -2447,7 +3007,7 @@
           <a:p>
             <a:fld id="{AB8D34D5-F463-4000-9075-ABAEA5C4102B}" type="datetimeFigureOut">
               <a:rPr lang="en-US" smtClean="0"/>
-              <a:t>6/17/2020</a:t>
+              <a:t>6/18/2020</a:t>
             </a:fld>
             <a:endParaRPr lang="en-US"/>
           </a:p>
@@ -2593,7 +3153,7 @@
           <a:p>
             <a:fld id="{AB8D34D5-F463-4000-9075-ABAEA5C4102B}" type="datetimeFigureOut">
               <a:rPr lang="en-US" smtClean="0"/>
-              <a:t>6/17/2020</a:t>
+              <a:t>6/18/2020</a:t>
             </a:fld>
             <a:endParaRPr lang="en-US"/>
           </a:p>
@@ -3246,7 +3806,7 @@
           <a:p>
             <a:fld id="{AB8D34D5-F463-4000-9075-ABAEA5C4102B}" type="datetimeFigureOut">
               <a:rPr lang="en-US" smtClean="0"/>
-              <a:t>6/17/2020</a:t>
+              <a:t>6/18/2020</a:t>
             </a:fld>
             <a:endParaRPr lang="en-US"/>
           </a:p>
@@ -3715,6 +4275,113 @@
           </a:p>
         </p:txBody>
       </p:sp>
+      <p:pic>
+        <p:nvPicPr>
+          <p:cNvPr id="4" name="Picture 3">
+            <a:extLst>
+              <a:ext uri="{FF2B5EF4-FFF2-40B4-BE49-F238E27FC236}">
+                <a16:creationId xmlns:a16="http://schemas.microsoft.com/office/drawing/2014/main" id="{A347EFF9-286A-4E85-8A49-75ED0A3EC5FB}"/>
+              </a:ext>
+            </a:extLst>
+          </p:cNvPr>
+          <p:cNvPicPr>
+            <a:picLocks noChangeAspect="1"/>
+          </p:cNvPicPr>
+          <p:nvPr/>
+        </p:nvPicPr>
+        <p:blipFill>
+          <a:blip r:embed="rId2"/>
+          <a:stretch>
+            <a:fillRect/>
+          </a:stretch>
+        </p:blipFill>
+        <p:spPr>
+          <a:xfrm>
+            <a:off x="1524000" y="4463852"/>
+            <a:ext cx="3122477" cy="2157289"/>
+          </a:xfrm>
+          <a:prstGeom prst="rect">
+            <a:avLst/>
+          </a:prstGeom>
+        </p:spPr>
+      </p:pic>
+      <p:pic>
+        <p:nvPicPr>
+          <p:cNvPr id="3074" name="Picture 2" descr="HackRF One Bundle - Hacker Warehouse">
+            <a:extLst>
+              <a:ext uri="{FF2B5EF4-FFF2-40B4-BE49-F238E27FC236}">
+                <a16:creationId xmlns:a16="http://schemas.microsoft.com/office/drawing/2014/main" id="{74929D93-C63E-42D2-AE3A-466DBA4FAD56}"/>
+              </a:ext>
+            </a:extLst>
+          </p:cNvPr>
+          <p:cNvPicPr>
+            <a:picLocks noChangeAspect="1" noChangeArrowheads="1"/>
+          </p:cNvPicPr>
+          <p:nvPr/>
+        </p:nvPicPr>
+        <p:blipFill>
+          <a:blip r:embed="rId3">
+            <a:extLst>
+              <a:ext uri="{28A0092B-C50C-407E-A947-70E740481C1C}">
+                <a14:useLocalDpi xmlns:a14="http://schemas.microsoft.com/office/drawing/2010/main" val="0"/>
+              </a:ext>
+            </a:extLst>
+          </a:blip>
+          <a:srcRect/>
+          <a:stretch>
+            <a:fillRect/>
+          </a:stretch>
+        </p:blipFill>
+        <p:spPr bwMode="auto">
+          <a:xfrm>
+            <a:off x="4995964" y="4640721"/>
+            <a:ext cx="2705100" cy="1695450"/>
+          </a:xfrm>
+          <a:prstGeom prst="rect">
+            <a:avLst/>
+          </a:prstGeom>
+          <a:noFill/>
+          <a:extLst>
+            <a:ext uri="{909E8E84-426E-40DD-AFC4-6F175D3DCCD1}">
+              <a14:hiddenFill xmlns:a14="http://schemas.microsoft.com/office/drawing/2010/main">
+                <a:solidFill>
+                  <a:srgbClr val="FFFFFF"/>
+                </a:solidFill>
+              </a14:hiddenFill>
+            </a:ext>
+          </a:extLst>
+        </p:spPr>
+      </p:pic>
+      <p:pic>
+        <p:nvPicPr>
+          <p:cNvPr id="5" name="Picture 4">
+            <a:extLst>
+              <a:ext uri="{FF2B5EF4-FFF2-40B4-BE49-F238E27FC236}">
+                <a16:creationId xmlns:a16="http://schemas.microsoft.com/office/drawing/2014/main" id="{8FE6BD17-3C90-43DB-A822-12B40F928401}"/>
+              </a:ext>
+            </a:extLst>
+          </p:cNvPr>
+          <p:cNvPicPr>
+            <a:picLocks noChangeAspect="1"/>
+          </p:cNvPicPr>
+          <p:nvPr/>
+        </p:nvPicPr>
+        <p:blipFill>
+          <a:blip r:embed="rId4"/>
+          <a:stretch>
+            <a:fillRect/>
+          </a:stretch>
+        </p:blipFill>
+        <p:spPr>
+          <a:xfrm>
+            <a:off x="8050551" y="4559758"/>
+            <a:ext cx="2466975" cy="1857375"/>
+          </a:xfrm>
+          <a:prstGeom prst="rect">
+            <a:avLst/>
+          </a:prstGeom>
+        </p:spPr>
+      </p:pic>
     </p:spTree>
     <p:extLst>
       <p:ext uri="{BB962C8B-B14F-4D97-AF65-F5344CB8AC3E}">
@@ -3916,34 +4583,59 @@
         <p:spPr/>
         <p:txBody>
           <a:bodyPr>
-            <a:normAutofit lnSpcReduction="10000"/>
+            <a:normAutofit fontScale="92500"/>
           </a:bodyPr>
           <a:lstStyle/>
           <a:p>
-            <a:r>
-              <a:rPr lang="en-US" dirty="0"/>
-              <a:t>GPS spoofing is becoming increasingly prevalent with an increase in commercial systems, like Software Defined Radio, that are capable of mimicking GPS signals</a:t>
-            </a:r>
-          </a:p>
-          <a:p>
+            <a:pPr>
+              <a:lnSpc>
+                <a:spcPct val="150000"/>
+              </a:lnSpc>
+            </a:pPr>
+            <a:r>
+              <a:rPr lang="en-US" dirty="0"/>
+              <a:t>Software Defined Radio has made GPS spoofing commonplace</a:t>
+            </a:r>
+          </a:p>
+          <a:p>
+            <a:pPr>
+              <a:lnSpc>
+                <a:spcPct val="150000"/>
+              </a:lnSpc>
+            </a:pPr>
             <a:r>
               <a:rPr lang="en-US" dirty="0"/>
               <a:t>USAF assets heavily rely on GPS for navigation and timing</a:t>
             </a:r>
           </a:p>
           <a:p>
-            <a:r>
-              <a:rPr lang="en-US" dirty="0"/>
-              <a:t>Adversaries, namely Iran, have shown their capabilities with GPS spoofing and compromised military and civilian air and sea vehicles</a:t>
-            </a:r>
-          </a:p>
-          <a:p>
+            <a:pPr>
+              <a:lnSpc>
+                <a:spcPct val="150000"/>
+              </a:lnSpc>
+            </a:pPr>
+            <a:r>
+              <a:rPr lang="en-US" dirty="0"/>
+              <a:t>Iranian use of GPS Spoofing</a:t>
+            </a:r>
+          </a:p>
+          <a:p>
+            <a:pPr>
+              <a:lnSpc>
+                <a:spcPct val="150000"/>
+              </a:lnSpc>
+            </a:pPr>
             <a:r>
               <a:rPr lang="en-US" dirty="0"/>
               <a:t>MIL-STD-1553 is a serial, avionics communications bus with assumed trust between components</a:t>
             </a:r>
           </a:p>
           <a:p>
+            <a:pPr>
+              <a:lnSpc>
+                <a:spcPct val="150000"/>
+              </a:lnSpc>
+            </a:pPr>
             <a:r>
               <a:rPr lang="en-US" dirty="0"/>
               <a:t>Many approaches to mitigating GPS spoofing are costly, inflexible, and physical</a:t>
@@ -4032,21 +4724,36 @@
           <a:bodyPr/>
           <a:lstStyle/>
           <a:p>
+            <a:pPr>
+              <a:lnSpc>
+                <a:spcPct val="100000"/>
+              </a:lnSpc>
+            </a:pPr>
             <a:r>
               <a:rPr lang="en-US" dirty="0"/>
               <a:t>Problem: The USAF lacks a flexible and lightweight solution to detect GPS spoofing across their many assets.</a:t>
             </a:r>
           </a:p>
           <a:p>
+            <a:pPr>
+              <a:lnSpc>
+                <a:spcPct val="100000"/>
+              </a:lnSpc>
+            </a:pPr>
             <a:r>
               <a:rPr lang="en-US" dirty="0"/>
               <a:t>Research Hypothesis: A bus monitor, with a trained machine learning model, could effectively detect a GPS spoofing attack using data obtained from the messages passed on the bus.</a:t>
             </a:r>
           </a:p>
           <a:p>
-            <a:r>
-              <a:rPr lang="en-US" dirty="0"/>
-              <a:t>Research Questions: What is the best model to classify the messages as spoofed or </a:t>
+            <a:pPr>
+              <a:lnSpc>
+                <a:spcPct val="100000"/>
+              </a:lnSpc>
+            </a:pPr>
+            <a:r>
+              <a:rPr lang="en-US" dirty="0"/>
+              <a:t>Research Questions: What is the best model to classify MIL-STD-1553 messages as spoofed or </a:t>
             </a:r>
             <a:r>
               <a:rPr lang="en-US" dirty="0" err="1"/>
@@ -4054,7 +4761,18 @@
             </a:r>
             <a:r>
               <a:rPr lang="en-US" dirty="0"/>
-              <a:t>? </a:t>
+              <a:t>?</a:t>
+            </a:r>
+          </a:p>
+          <a:p>
+            <a:pPr>
+              <a:lnSpc>
+                <a:spcPct val="100000"/>
+              </a:lnSpc>
+            </a:pPr>
+            <a:r>
+              <a:rPr lang="en-US" dirty="0"/>
+              <a:t>Primary Measure of Effectiveness: Recall </a:t>
             </a:r>
           </a:p>
         </p:txBody>
@@ -4135,12 +4853,73 @@
         </p:nvSpPr>
         <p:spPr/>
         <p:txBody>
-          <a:bodyPr/>
-          <a:lstStyle/>
-          <a:p>
-            <a:r>
-              <a:rPr lang="en-US" dirty="0"/>
-              <a:t>AFRL’s Avionics Vulnerability Assessment System (AVAS) uses a flight simulator to generate MIL-STD-1553 messages and send them over the bus, where their Vampire FPGA converts the messages to UDP packets</a:t>
+          <a:bodyPr>
+            <a:normAutofit/>
+          </a:bodyPr>
+          <a:lstStyle/>
+          <a:p>
+            <a:r>
+              <a:rPr lang="en-US" dirty="0"/>
+              <a:t>Marvin - AFRL’s Avionics Vulnerability Assessment System (AVAS) in tandem with Vampire FPGA</a:t>
+            </a:r>
+          </a:p>
+          <a:p>
+            <a:r>
+              <a:rPr lang="en-US" dirty="0"/>
+              <a:t>Message parsing:</a:t>
+            </a:r>
+          </a:p>
+          <a:p>
+            <a:pPr lvl="1"/>
+            <a:r>
+              <a:rPr lang="en-US" dirty="0"/>
+              <a:t>Convert to usable form, break up words and extract data</a:t>
+            </a:r>
+          </a:p>
+          <a:p>
+            <a:pPr lvl="1"/>
+            <a:r>
+              <a:rPr lang="en-US" dirty="0"/>
+              <a:t>Remove unrelated messages</a:t>
+            </a:r>
+          </a:p>
+          <a:p>
+            <a:pPr lvl="1"/>
+            <a:r>
+              <a:rPr lang="en-US" dirty="0" err="1"/>
+              <a:t>Downsample</a:t>
+            </a:r>
+            <a:endParaRPr lang="en-US" dirty="0"/>
+          </a:p>
+          <a:p>
+            <a:pPr lvl="1"/>
+            <a:r>
+              <a:rPr lang="en-US" dirty="0"/>
+              <a:t>Scale</a:t>
+            </a:r>
+          </a:p>
+          <a:p>
+            <a:r>
+              <a:rPr lang="en-US" dirty="0"/>
+              <a:t>Features: </a:t>
+            </a:r>
+          </a:p>
+          <a:p>
+            <a:pPr lvl="1"/>
+            <a:r>
+              <a:rPr lang="en-US" sz="1800" dirty="0"/>
+              <a:t>Spoofed – GPS: Latitude, Longitude, Altitude</a:t>
+            </a:r>
+          </a:p>
+          <a:p>
+            <a:pPr lvl="1"/>
+            <a:r>
+              <a:rPr lang="en-US" sz="1800" dirty="0" err="1"/>
+              <a:t>Unspoofed</a:t>
+            </a:r>
+            <a:r>
+              <a:rPr lang="en-US" sz="1800" dirty="0"/>
+              <a:t> – ADC: Altitude, Airspeed; EFI: Angle of Attack; INS: x/y/z Velocity, Acceleration; GPS: Time</a:t>
             </a:r>
           </a:p>
         </p:txBody>
@@ -4158,14 +4937,14 @@
           <p:nvPr/>
         </p:nvPicPr>
         <p:blipFill>
-          <a:blip r:embed="rId2"/>
+          <a:blip r:embed="rId3"/>
           <a:stretch>
             <a:fillRect/>
           </a:stretch>
         </p:blipFill>
         <p:spPr>
           <a:xfrm>
-            <a:off x="8473441" y="4384040"/>
+            <a:off x="8708966" y="3521279"/>
             <a:ext cx="3169920" cy="1927860"/>
           </a:xfrm>
           <a:prstGeom prst="rect">
@@ -4177,6 +4956,885 @@
     <p:extLst>
       <p:ext uri="{BB962C8B-B14F-4D97-AF65-F5344CB8AC3E}">
         <p14:creationId xmlns:p14="http://schemas.microsoft.com/office/powerpoint/2010/main" val="1123012899"/>
+      </p:ext>
+    </p:extLst>
+  </p:cSld>
+  <p:clrMapOvr>
+    <a:masterClrMapping/>
+  </p:clrMapOvr>
+</p:sld>
+</file>
+
+<file path=ppt/slides/slide6.xml><?xml version="1.0" encoding="utf-8"?>
+<p:sld xmlns:a="http://schemas.openxmlformats.org/drawingml/2006/main" xmlns:r="http://schemas.openxmlformats.org/officeDocument/2006/relationships" xmlns:p="http://schemas.openxmlformats.org/presentationml/2006/main">
+  <p:cSld>
+    <p:spTree>
+      <p:nvGrpSpPr>
+        <p:cNvPr id="1" name=""/>
+        <p:cNvGrpSpPr/>
+        <p:nvPr/>
+      </p:nvGrpSpPr>
+      <p:grpSpPr>
+        <a:xfrm>
+          <a:off x="0" y="0"/>
+          <a:ext cx="0" cy="0"/>
+          <a:chOff x="0" y="0"/>
+          <a:chExt cx="0" cy="0"/>
+        </a:xfrm>
+      </p:grpSpPr>
+      <p:sp>
+        <p:nvSpPr>
+          <p:cNvPr id="2" name="Title 1">
+            <a:extLst>
+              <a:ext uri="{FF2B5EF4-FFF2-40B4-BE49-F238E27FC236}">
+                <a16:creationId xmlns:a16="http://schemas.microsoft.com/office/drawing/2014/main" id="{6C961C51-D7C8-4D57-B0C5-713B41774D5A}"/>
+              </a:ext>
+            </a:extLst>
+          </p:cNvPr>
+          <p:cNvSpPr>
+            <a:spLocks noGrp="1"/>
+          </p:cNvSpPr>
+          <p:nvPr>
+            <p:ph type="title"/>
+          </p:nvPr>
+        </p:nvSpPr>
+        <p:spPr/>
+        <p:txBody>
+          <a:bodyPr/>
+          <a:lstStyle/>
+          <a:p>
+            <a:r>
+              <a:rPr lang="en-US" dirty="0"/>
+              <a:t>Methodology</a:t>
+            </a:r>
+          </a:p>
+        </p:txBody>
+      </p:sp>
+      <p:sp>
+        <p:nvSpPr>
+          <p:cNvPr id="3" name="Content Placeholder 2">
+            <a:extLst>
+              <a:ext uri="{FF2B5EF4-FFF2-40B4-BE49-F238E27FC236}">
+                <a16:creationId xmlns:a16="http://schemas.microsoft.com/office/drawing/2014/main" id="{18D3952D-1E9A-45D1-BE09-A1BC5672A09E}"/>
+              </a:ext>
+            </a:extLst>
+          </p:cNvPr>
+          <p:cNvSpPr>
+            <a:spLocks noGrp="1"/>
+          </p:cNvSpPr>
+          <p:nvPr>
+            <p:ph idx="1"/>
+          </p:nvPr>
+        </p:nvSpPr>
+        <p:spPr/>
+        <p:txBody>
+          <a:bodyPr>
+            <a:normAutofit fontScale="92500" lnSpcReduction="10000"/>
+          </a:bodyPr>
+          <a:lstStyle/>
+          <a:p>
+            <a:r>
+              <a:rPr lang="en-US" dirty="0"/>
+              <a:t>3 classical, supervised ML classification approaches: </a:t>
+            </a:r>
+          </a:p>
+          <a:p>
+            <a:pPr lvl="1"/>
+            <a:r>
+              <a:rPr lang="en-US" dirty="0"/>
+              <a:t>Logistic Regression with CV (5 fold)</a:t>
+            </a:r>
+          </a:p>
+          <a:p>
+            <a:pPr lvl="1"/>
+            <a:r>
+              <a:rPr lang="en-US" dirty="0"/>
+              <a:t>Naïve Bayes (Gaussian)</a:t>
+            </a:r>
+          </a:p>
+          <a:p>
+            <a:pPr lvl="1"/>
+            <a:r>
+              <a:rPr lang="en-US" dirty="0"/>
+              <a:t>Random Forest (100 trees)</a:t>
+            </a:r>
+          </a:p>
+          <a:p>
+            <a:r>
+              <a:rPr lang="en-US" dirty="0"/>
+              <a:t>Trained and Tested on:</a:t>
+            </a:r>
+          </a:p>
+          <a:p>
+            <a:pPr lvl="1"/>
+            <a:r>
+              <a:rPr lang="en-US" dirty="0"/>
+              <a:t>Each drift rate individually (80/20)</a:t>
+            </a:r>
+          </a:p>
+          <a:p>
+            <a:pPr lvl="1"/>
+            <a:r>
+              <a:rPr lang="en-US" dirty="0"/>
+              <a:t>All of the data combined (80/20)</a:t>
+            </a:r>
+          </a:p>
+          <a:p>
+            <a:pPr lvl="1"/>
+            <a:r>
+              <a:rPr lang="en-US" dirty="0"/>
+              <a:t>All but one drift rate, test on unseen rate</a:t>
+            </a:r>
+          </a:p>
+          <a:p>
+            <a:r>
+              <a:rPr lang="en-US" dirty="0"/>
+              <a:t>Metrics:</a:t>
+            </a:r>
+          </a:p>
+          <a:p>
+            <a:pPr lvl="1"/>
+            <a:r>
+              <a:rPr lang="en-US" dirty="0"/>
+              <a:t>Precision</a:t>
+            </a:r>
+          </a:p>
+          <a:p>
+            <a:pPr lvl="1"/>
+            <a:r>
+              <a:rPr lang="en-US" dirty="0"/>
+              <a:t>Recall</a:t>
+            </a:r>
+          </a:p>
+          <a:p>
+            <a:pPr lvl="1"/>
+            <a:r>
+              <a:rPr lang="en-US" dirty="0"/>
+              <a:t>F1 Score</a:t>
+            </a:r>
+          </a:p>
+        </p:txBody>
+      </p:sp>
+      <p:pic>
+        <p:nvPicPr>
+          <p:cNvPr id="4" name="Picture 3">
+            <a:extLst>
+              <a:ext uri="{FF2B5EF4-FFF2-40B4-BE49-F238E27FC236}">
+                <a16:creationId xmlns:a16="http://schemas.microsoft.com/office/drawing/2014/main" id="{23ABE90C-4D12-4D84-B06D-19B996348A9F}"/>
+              </a:ext>
+            </a:extLst>
+          </p:cNvPr>
+          <p:cNvPicPr>
+            <a:picLocks noChangeAspect="1"/>
+          </p:cNvPicPr>
+          <p:nvPr/>
+        </p:nvPicPr>
+        <p:blipFill rotWithShape="1">
+          <a:blip r:embed="rId2"/>
+          <a:srcRect l="11364" r="11238" b="16448"/>
+          <a:stretch/>
+        </p:blipFill>
+        <p:spPr>
+          <a:xfrm>
+            <a:off x="7655021" y="2759801"/>
+            <a:ext cx="3988340" cy="2482985"/>
+          </a:xfrm>
+          <a:prstGeom prst="rect">
+            <a:avLst/>
+          </a:prstGeom>
+        </p:spPr>
+      </p:pic>
+    </p:spTree>
+    <p:extLst>
+      <p:ext uri="{BB962C8B-B14F-4D97-AF65-F5344CB8AC3E}">
+        <p14:creationId xmlns:p14="http://schemas.microsoft.com/office/powerpoint/2010/main" val="1627501345"/>
+      </p:ext>
+    </p:extLst>
+  </p:cSld>
+  <p:clrMapOvr>
+    <a:masterClrMapping/>
+  </p:clrMapOvr>
+</p:sld>
+</file>
+
+<file path=ppt/slides/slide7.xml><?xml version="1.0" encoding="utf-8"?>
+<p:sld xmlns:a="http://schemas.openxmlformats.org/drawingml/2006/main" xmlns:r="http://schemas.openxmlformats.org/officeDocument/2006/relationships" xmlns:p="http://schemas.openxmlformats.org/presentationml/2006/main">
+  <p:cSld>
+    <p:spTree>
+      <p:nvGrpSpPr>
+        <p:cNvPr id="1" name=""/>
+        <p:cNvGrpSpPr/>
+        <p:nvPr/>
+      </p:nvGrpSpPr>
+      <p:grpSpPr>
+        <a:xfrm>
+          <a:off x="0" y="0"/>
+          <a:ext cx="0" cy="0"/>
+          <a:chOff x="0" y="0"/>
+          <a:chExt cx="0" cy="0"/>
+        </a:xfrm>
+      </p:grpSpPr>
+      <p:sp>
+        <p:nvSpPr>
+          <p:cNvPr id="2" name="Title 1">
+            <a:extLst>
+              <a:ext uri="{FF2B5EF4-FFF2-40B4-BE49-F238E27FC236}">
+                <a16:creationId xmlns:a16="http://schemas.microsoft.com/office/drawing/2014/main" id="{DB05BA0C-EE49-4155-B37D-2C6DDD0EDF41}"/>
+              </a:ext>
+            </a:extLst>
+          </p:cNvPr>
+          <p:cNvSpPr>
+            <a:spLocks noGrp="1"/>
+          </p:cNvSpPr>
+          <p:nvPr>
+            <p:ph type="title"/>
+          </p:nvPr>
+        </p:nvSpPr>
+        <p:spPr/>
+        <p:txBody>
+          <a:bodyPr/>
+          <a:lstStyle/>
+          <a:p>
+            <a:r>
+              <a:rPr lang="en-US" dirty="0"/>
+              <a:t>Results</a:t>
+            </a:r>
+          </a:p>
+        </p:txBody>
+      </p:sp>
+      <p:sp>
+        <p:nvSpPr>
+          <p:cNvPr id="7" name="Content Placeholder 6">
+            <a:extLst>
+              <a:ext uri="{FF2B5EF4-FFF2-40B4-BE49-F238E27FC236}">
+                <a16:creationId xmlns:a16="http://schemas.microsoft.com/office/drawing/2014/main" id="{13F3EC7E-3254-430D-9116-3F8996B7A8E8}"/>
+              </a:ext>
+            </a:extLst>
+          </p:cNvPr>
+          <p:cNvSpPr>
+            <a:spLocks noGrp="1"/>
+          </p:cNvSpPr>
+          <p:nvPr>
+            <p:ph idx="1"/>
+          </p:nvPr>
+        </p:nvSpPr>
+        <p:spPr/>
+        <p:txBody>
+          <a:bodyPr>
+            <a:normAutofit fontScale="92500"/>
+          </a:bodyPr>
+          <a:lstStyle/>
+          <a:p>
+            <a:pPr>
+              <a:lnSpc>
+                <a:spcPct val="150000"/>
+              </a:lnSpc>
+            </a:pPr>
+            <a:r>
+              <a:rPr lang="en-US" dirty="0"/>
+              <a:t>Logistic Regression w/ CV</a:t>
+            </a:r>
+          </a:p>
+          <a:p>
+            <a:pPr lvl="1">
+              <a:lnSpc>
+                <a:spcPct val="150000"/>
+              </a:lnSpc>
+            </a:pPr>
+            <a:r>
+              <a:rPr lang="en-US" dirty="0"/>
+              <a:t>Performed well for high drift rates and hold position</a:t>
+            </a:r>
+          </a:p>
+          <a:p>
+            <a:pPr>
+              <a:lnSpc>
+                <a:spcPct val="150000"/>
+              </a:lnSpc>
+            </a:pPr>
+            <a:r>
+              <a:rPr lang="en-US" dirty="0"/>
+              <a:t>Gaussian Naïve Bayes</a:t>
+            </a:r>
+          </a:p>
+          <a:p>
+            <a:pPr lvl="1">
+              <a:lnSpc>
+                <a:spcPct val="150000"/>
+              </a:lnSpc>
+            </a:pPr>
+            <a:r>
+              <a:rPr lang="en-US" dirty="0"/>
+              <a:t>Very similar results to Logistic Regression</a:t>
+            </a:r>
+          </a:p>
+          <a:p>
+            <a:pPr>
+              <a:lnSpc>
+                <a:spcPct val="150000"/>
+              </a:lnSpc>
+            </a:pPr>
+            <a:r>
+              <a:rPr lang="en-US" dirty="0"/>
+              <a:t>Random Forests</a:t>
+            </a:r>
+          </a:p>
+          <a:p>
+            <a:pPr lvl="1">
+              <a:lnSpc>
+                <a:spcPct val="150000"/>
+              </a:lnSpc>
+            </a:pPr>
+            <a:r>
+              <a:rPr lang="en-US" dirty="0"/>
+              <a:t>Perfect in all cases but unseen attacks</a:t>
+            </a:r>
+          </a:p>
+          <a:p>
+            <a:pPr lvl="1">
+              <a:lnSpc>
+                <a:spcPct val="150000"/>
+              </a:lnSpc>
+            </a:pPr>
+            <a:r>
+              <a:rPr lang="en-US" dirty="0"/>
+              <a:t>Best all around results</a:t>
+            </a:r>
+          </a:p>
+        </p:txBody>
+      </p:sp>
+      <p:pic>
+        <p:nvPicPr>
+          <p:cNvPr id="9" name="Picture 8">
+            <a:extLst>
+              <a:ext uri="{FF2B5EF4-FFF2-40B4-BE49-F238E27FC236}">
+                <a16:creationId xmlns:a16="http://schemas.microsoft.com/office/drawing/2014/main" id="{61EDBD69-BB35-4F21-92F6-199FD2C98800}"/>
+              </a:ext>
+            </a:extLst>
+          </p:cNvPr>
+          <p:cNvPicPr>
+            <a:picLocks noChangeAspect="1"/>
+          </p:cNvPicPr>
+          <p:nvPr/>
+        </p:nvPicPr>
+        <p:blipFill>
+          <a:blip r:embed="rId2"/>
+          <a:stretch>
+            <a:fillRect/>
+          </a:stretch>
+        </p:blipFill>
+        <p:spPr>
+          <a:xfrm>
+            <a:off x="8164136" y="1825625"/>
+            <a:ext cx="3714750" cy="2495550"/>
+          </a:xfrm>
+          <a:prstGeom prst="rect">
+            <a:avLst/>
+          </a:prstGeom>
+        </p:spPr>
+      </p:pic>
+      <p:pic>
+        <p:nvPicPr>
+          <p:cNvPr id="11" name="Picture 10">
+            <a:extLst>
+              <a:ext uri="{FF2B5EF4-FFF2-40B4-BE49-F238E27FC236}">
+                <a16:creationId xmlns:a16="http://schemas.microsoft.com/office/drawing/2014/main" id="{337CBA25-0C35-401F-9DF5-7406C3971804}"/>
+              </a:ext>
+            </a:extLst>
+          </p:cNvPr>
+          <p:cNvPicPr>
+            <a:picLocks noChangeAspect="1"/>
+          </p:cNvPicPr>
+          <p:nvPr/>
+        </p:nvPicPr>
+        <p:blipFill>
+          <a:blip r:embed="rId3"/>
+          <a:stretch>
+            <a:fillRect/>
+          </a:stretch>
+        </p:blipFill>
+        <p:spPr>
+          <a:xfrm>
+            <a:off x="8321298" y="4824413"/>
+            <a:ext cx="3400425" cy="1352550"/>
+          </a:xfrm>
+          <a:prstGeom prst="rect">
+            <a:avLst/>
+          </a:prstGeom>
+        </p:spPr>
+      </p:pic>
+    </p:spTree>
+    <p:extLst>
+      <p:ext uri="{BB962C8B-B14F-4D97-AF65-F5344CB8AC3E}">
+        <p14:creationId xmlns:p14="http://schemas.microsoft.com/office/powerpoint/2010/main" val="102894643"/>
+      </p:ext>
+    </p:extLst>
+  </p:cSld>
+  <p:clrMapOvr>
+    <a:masterClrMapping/>
+  </p:clrMapOvr>
+</p:sld>
+</file>
+
+<file path=ppt/slides/slide8.xml><?xml version="1.0" encoding="utf-8"?>
+<p:sld xmlns:a="http://schemas.openxmlformats.org/drawingml/2006/main" xmlns:r="http://schemas.openxmlformats.org/officeDocument/2006/relationships" xmlns:p="http://schemas.openxmlformats.org/presentationml/2006/main">
+  <p:cSld>
+    <p:spTree>
+      <p:nvGrpSpPr>
+        <p:cNvPr id="1" name=""/>
+        <p:cNvGrpSpPr/>
+        <p:nvPr/>
+      </p:nvGrpSpPr>
+      <p:grpSpPr>
+        <a:xfrm>
+          <a:off x="0" y="0"/>
+          <a:ext cx="0" cy="0"/>
+          <a:chOff x="0" y="0"/>
+          <a:chExt cx="0" cy="0"/>
+        </a:xfrm>
+      </p:grpSpPr>
+      <p:sp>
+        <p:nvSpPr>
+          <p:cNvPr id="2" name="Title 1">
+            <a:extLst>
+              <a:ext uri="{FF2B5EF4-FFF2-40B4-BE49-F238E27FC236}">
+                <a16:creationId xmlns:a16="http://schemas.microsoft.com/office/drawing/2014/main" id="{C9A5C012-7F30-4D87-9DE2-49D7079362AA}"/>
+              </a:ext>
+            </a:extLst>
+          </p:cNvPr>
+          <p:cNvSpPr>
+            <a:spLocks noGrp="1"/>
+          </p:cNvSpPr>
+          <p:nvPr>
+            <p:ph type="title"/>
+          </p:nvPr>
+        </p:nvSpPr>
+        <p:spPr/>
+        <p:txBody>
+          <a:bodyPr/>
+          <a:lstStyle/>
+          <a:p>
+            <a:r>
+              <a:rPr lang="en-US" dirty="0"/>
+              <a:t>Conclusions</a:t>
+            </a:r>
+          </a:p>
+        </p:txBody>
+      </p:sp>
+      <p:sp>
+        <p:nvSpPr>
+          <p:cNvPr id="3" name="Content Placeholder 2">
+            <a:extLst>
+              <a:ext uri="{FF2B5EF4-FFF2-40B4-BE49-F238E27FC236}">
+                <a16:creationId xmlns:a16="http://schemas.microsoft.com/office/drawing/2014/main" id="{1CC63D89-6F5E-4505-87D8-87CB9BA04445}"/>
+              </a:ext>
+            </a:extLst>
+          </p:cNvPr>
+          <p:cNvSpPr>
+            <a:spLocks noGrp="1"/>
+          </p:cNvSpPr>
+          <p:nvPr>
+            <p:ph idx="1"/>
+          </p:nvPr>
+        </p:nvSpPr>
+        <p:spPr/>
+        <p:txBody>
+          <a:bodyPr/>
+          <a:lstStyle/>
+          <a:p>
+            <a:r>
+              <a:rPr lang="en-US" dirty="0"/>
+              <a:t>Unseen drift rates greatly impact the models</a:t>
+            </a:r>
+          </a:p>
+          <a:p>
+            <a:r>
+              <a:rPr lang="en-US" dirty="0"/>
+              <a:t>More precise attacks will be more difficult to detect</a:t>
+            </a:r>
+          </a:p>
+          <a:p>
+            <a:r>
+              <a:rPr lang="en-US" dirty="0"/>
+              <a:t>Random Forests perform marginally better than</a:t>
+            </a:r>
+          </a:p>
+          <a:p>
+            <a:pPr marL="0" indent="0">
+              <a:buNone/>
+            </a:pPr>
+            <a:r>
+              <a:rPr lang="en-US" dirty="0"/>
+              <a:t>   Multivariate Long Short Term Fully Convolutional </a:t>
+            </a:r>
+          </a:p>
+          <a:p>
+            <a:pPr marL="0" indent="0">
+              <a:buNone/>
+            </a:pPr>
+            <a:r>
+              <a:rPr lang="en-US" dirty="0"/>
+              <a:t>   Networks</a:t>
+            </a:r>
+          </a:p>
+        </p:txBody>
+      </p:sp>
+      <p:sp>
+        <p:nvSpPr>
+          <p:cNvPr id="4" name="AutoShape 2" descr="png">
+            <a:extLst>
+              <a:ext uri="{FF2B5EF4-FFF2-40B4-BE49-F238E27FC236}">
+                <a16:creationId xmlns:a16="http://schemas.microsoft.com/office/drawing/2014/main" id="{21925CBF-12E1-4559-AE15-CD6C3CBCC87E}"/>
+              </a:ext>
+            </a:extLst>
+          </p:cNvPr>
+          <p:cNvSpPr>
+            <a:spLocks noChangeAspect="1" noChangeArrowheads="1"/>
+          </p:cNvSpPr>
+          <p:nvPr/>
+        </p:nvSpPr>
+        <p:spPr bwMode="auto">
+          <a:xfrm>
+            <a:off x="5943600" y="3276600"/>
+            <a:ext cx="304800" cy="304800"/>
+          </a:xfrm>
+          <a:prstGeom prst="rect">
+            <a:avLst/>
+          </a:prstGeom>
+          <a:noFill/>
+          <a:extLst>
+            <a:ext uri="{909E8E84-426E-40DD-AFC4-6F175D3DCCD1}">
+              <a14:hiddenFill xmlns:a14="http://schemas.microsoft.com/office/drawing/2010/main">
+                <a:solidFill>
+                  <a:srgbClr val="FFFFFF"/>
+                </a:solidFill>
+              </a14:hiddenFill>
+            </a:ext>
+          </a:extLst>
+        </p:spPr>
+        <p:txBody>
+          <a:bodyPr vert="horz" wrap="square" lIns="91440" tIns="45720" rIns="91440" bIns="45720" numCol="1" anchor="t" anchorCtr="0" compatLnSpc="1">
+            <a:prstTxWarp prst="textNoShape">
+              <a:avLst/>
+            </a:prstTxWarp>
+          </a:bodyPr>
+          <a:lstStyle/>
+          <a:p>
+            <a:endParaRPr lang="en-US"/>
+          </a:p>
+        </p:txBody>
+      </p:sp>
+      <p:pic>
+        <p:nvPicPr>
+          <p:cNvPr id="7" name="Picture 6" descr="Results for Unseen Fixed Point Spoof&#10;">
+            <a:extLst>
+              <a:ext uri="{FF2B5EF4-FFF2-40B4-BE49-F238E27FC236}">
+                <a16:creationId xmlns:a16="http://schemas.microsoft.com/office/drawing/2014/main" id="{664B19BB-F5C3-4487-9B01-2C6462DDAB0F}"/>
+              </a:ext>
+            </a:extLst>
+          </p:cNvPr>
+          <p:cNvPicPr>
+            <a:picLocks noChangeAspect="1"/>
+          </p:cNvPicPr>
+          <p:nvPr/>
+        </p:nvPicPr>
+        <p:blipFill>
+          <a:blip r:embed="rId2">
+            <a:extLst>
+              <a:ext uri="{28A0092B-C50C-407E-A947-70E740481C1C}">
+                <a14:useLocalDpi xmlns:a14="http://schemas.microsoft.com/office/drawing/2010/main" val="0"/>
+              </a:ext>
+            </a:extLst>
+          </a:blip>
+          <a:stretch>
+            <a:fillRect/>
+          </a:stretch>
+        </p:blipFill>
+        <p:spPr>
+          <a:xfrm>
+            <a:off x="8835361" y="1825625"/>
+            <a:ext cx="3043525" cy="2119868"/>
+          </a:xfrm>
+          <a:prstGeom prst="rect">
+            <a:avLst/>
+          </a:prstGeom>
+        </p:spPr>
+      </p:pic>
+      <p:sp>
+        <p:nvSpPr>
+          <p:cNvPr id="8" name="TextBox 7">
+            <a:extLst>
+              <a:ext uri="{FF2B5EF4-FFF2-40B4-BE49-F238E27FC236}">
+                <a16:creationId xmlns:a16="http://schemas.microsoft.com/office/drawing/2014/main" id="{D0404D5D-2F54-4060-B0F7-93437731B9A6}"/>
+              </a:ext>
+            </a:extLst>
+          </p:cNvPr>
+          <p:cNvSpPr txBox="1"/>
+          <p:nvPr/>
+        </p:nvSpPr>
+        <p:spPr>
+          <a:xfrm>
+            <a:off x="8964842" y="3909118"/>
+            <a:ext cx="2990850" cy="369332"/>
+          </a:xfrm>
+          <a:prstGeom prst="rect">
+            <a:avLst/>
+          </a:prstGeom>
+          <a:noFill/>
+        </p:spPr>
+        <p:txBody>
+          <a:bodyPr wrap="square" rtlCol="0">
+            <a:spAutoFit/>
+          </a:bodyPr>
+          <a:lstStyle/>
+          <a:p>
+            <a:r>
+              <a:rPr lang="en-US" dirty="0"/>
+              <a:t>Results for Unseen Fixed Point</a:t>
+            </a:r>
+          </a:p>
+        </p:txBody>
+      </p:sp>
+      <p:pic>
+        <p:nvPicPr>
+          <p:cNvPr id="10" name="Picture 9" descr="A screenshot of a cell phone&#10;&#10;Description automatically generated">
+            <a:extLst>
+              <a:ext uri="{FF2B5EF4-FFF2-40B4-BE49-F238E27FC236}">
+                <a16:creationId xmlns:a16="http://schemas.microsoft.com/office/drawing/2014/main" id="{FE962ED4-7A4B-486E-B43C-EDCBC8EC4CCE}"/>
+              </a:ext>
+            </a:extLst>
+          </p:cNvPr>
+          <p:cNvPicPr>
+            <a:picLocks noChangeAspect="1"/>
+          </p:cNvPicPr>
+          <p:nvPr/>
+        </p:nvPicPr>
+        <p:blipFill>
+          <a:blip r:embed="rId3">
+            <a:extLst>
+              <a:ext uri="{28A0092B-C50C-407E-A947-70E740481C1C}">
+                <a14:useLocalDpi xmlns:a14="http://schemas.microsoft.com/office/drawing/2010/main" val="0"/>
+              </a:ext>
+            </a:extLst>
+          </a:blip>
+          <a:stretch>
+            <a:fillRect/>
+          </a:stretch>
+        </p:blipFill>
+        <p:spPr>
+          <a:xfrm>
+            <a:off x="8888036" y="4362638"/>
+            <a:ext cx="2990850" cy="2083179"/>
+          </a:xfrm>
+          <a:prstGeom prst="rect">
+            <a:avLst/>
+          </a:prstGeom>
+        </p:spPr>
+      </p:pic>
+      <p:sp>
+        <p:nvSpPr>
+          <p:cNvPr id="11" name="TextBox 10">
+            <a:extLst>
+              <a:ext uri="{FF2B5EF4-FFF2-40B4-BE49-F238E27FC236}">
+                <a16:creationId xmlns:a16="http://schemas.microsoft.com/office/drawing/2014/main" id="{7D29E507-EFAA-4B07-9AF2-1C7E4E1008DC}"/>
+              </a:ext>
+            </a:extLst>
+          </p:cNvPr>
+          <p:cNvSpPr txBox="1"/>
+          <p:nvPr/>
+        </p:nvSpPr>
+        <p:spPr>
+          <a:xfrm>
+            <a:off x="8964842" y="6453077"/>
+            <a:ext cx="2990850" cy="369332"/>
+          </a:xfrm>
+          <a:prstGeom prst="rect">
+            <a:avLst/>
+          </a:prstGeom>
+          <a:noFill/>
+        </p:spPr>
+        <p:txBody>
+          <a:bodyPr wrap="square" rtlCol="0">
+            <a:spAutoFit/>
+          </a:bodyPr>
+          <a:lstStyle/>
+          <a:p>
+            <a:r>
+              <a:rPr lang="en-US" dirty="0"/>
+              <a:t>Results for Unseen 5m/s Drift</a:t>
+            </a:r>
+          </a:p>
+        </p:txBody>
+      </p:sp>
+      <p:pic>
+        <p:nvPicPr>
+          <p:cNvPr id="13" name="Picture 12">
+            <a:extLst>
+              <a:ext uri="{FF2B5EF4-FFF2-40B4-BE49-F238E27FC236}">
+                <a16:creationId xmlns:a16="http://schemas.microsoft.com/office/drawing/2014/main" id="{EFEFBC2C-7E14-4729-959F-43178441B8AE}"/>
+              </a:ext>
+            </a:extLst>
+          </p:cNvPr>
+          <p:cNvPicPr>
+            <a:picLocks noChangeAspect="1"/>
+          </p:cNvPicPr>
+          <p:nvPr/>
+        </p:nvPicPr>
+        <p:blipFill>
+          <a:blip r:embed="rId4"/>
+          <a:stretch>
+            <a:fillRect/>
+          </a:stretch>
+        </p:blipFill>
+        <p:spPr>
+          <a:xfrm>
+            <a:off x="3227159" y="4001294"/>
+            <a:ext cx="3400425" cy="2495550"/>
+          </a:xfrm>
+          <a:prstGeom prst="rect">
+            <a:avLst/>
+          </a:prstGeom>
+        </p:spPr>
+      </p:pic>
+    </p:spTree>
+    <p:extLst>
+      <p:ext uri="{BB962C8B-B14F-4D97-AF65-F5344CB8AC3E}">
+        <p14:creationId xmlns:p14="http://schemas.microsoft.com/office/powerpoint/2010/main" val="2660441843"/>
+      </p:ext>
+    </p:extLst>
+  </p:cSld>
+  <p:clrMapOvr>
+    <a:masterClrMapping/>
+  </p:clrMapOvr>
+</p:sld>
+</file>
+
+<file path=ppt/slides/slide9.xml><?xml version="1.0" encoding="utf-8"?>
+<p:sld xmlns:a="http://schemas.openxmlformats.org/drawingml/2006/main" xmlns:r="http://schemas.openxmlformats.org/officeDocument/2006/relationships" xmlns:p="http://schemas.openxmlformats.org/presentationml/2006/main">
+  <p:cSld>
+    <p:spTree>
+      <p:nvGrpSpPr>
+        <p:cNvPr id="1" name=""/>
+        <p:cNvGrpSpPr/>
+        <p:nvPr/>
+      </p:nvGrpSpPr>
+      <p:grpSpPr>
+        <a:xfrm>
+          <a:off x="0" y="0"/>
+          <a:ext cx="0" cy="0"/>
+          <a:chOff x="0" y="0"/>
+          <a:chExt cx="0" cy="0"/>
+        </a:xfrm>
+      </p:grpSpPr>
+      <p:sp>
+        <p:nvSpPr>
+          <p:cNvPr id="2" name="Title 1">
+            <a:extLst>
+              <a:ext uri="{FF2B5EF4-FFF2-40B4-BE49-F238E27FC236}">
+                <a16:creationId xmlns:a16="http://schemas.microsoft.com/office/drawing/2014/main" id="{780B4A8B-5943-4970-A373-5C3C7A1C1F5D}"/>
+              </a:ext>
+            </a:extLst>
+          </p:cNvPr>
+          <p:cNvSpPr>
+            <a:spLocks noGrp="1"/>
+          </p:cNvSpPr>
+          <p:nvPr>
+            <p:ph type="title"/>
+          </p:nvPr>
+        </p:nvSpPr>
+        <p:spPr/>
+        <p:txBody>
+          <a:bodyPr/>
+          <a:lstStyle/>
+          <a:p>
+            <a:r>
+              <a:rPr lang="en-US" dirty="0"/>
+              <a:t>Future Work</a:t>
+            </a:r>
+          </a:p>
+        </p:txBody>
+      </p:sp>
+      <p:sp>
+        <p:nvSpPr>
+          <p:cNvPr id="3" name="Content Placeholder 2">
+            <a:extLst>
+              <a:ext uri="{FF2B5EF4-FFF2-40B4-BE49-F238E27FC236}">
+                <a16:creationId xmlns:a16="http://schemas.microsoft.com/office/drawing/2014/main" id="{0DEB063A-DE7A-4E5E-8037-1E988D61E39A}"/>
+              </a:ext>
+            </a:extLst>
+          </p:cNvPr>
+          <p:cNvSpPr>
+            <a:spLocks noGrp="1"/>
+          </p:cNvSpPr>
+          <p:nvPr>
+            <p:ph idx="1"/>
+          </p:nvPr>
+        </p:nvSpPr>
+        <p:spPr/>
+        <p:txBody>
+          <a:bodyPr/>
+          <a:lstStyle/>
+          <a:p>
+            <a:pPr>
+              <a:lnSpc>
+                <a:spcPct val="150000"/>
+              </a:lnSpc>
+            </a:pPr>
+            <a:r>
+              <a:rPr lang="en-US" dirty="0"/>
+              <a:t>Get better data</a:t>
+            </a:r>
+          </a:p>
+          <a:p>
+            <a:pPr lvl="1">
+              <a:lnSpc>
+                <a:spcPct val="150000"/>
+              </a:lnSpc>
+            </a:pPr>
+            <a:r>
+              <a:rPr lang="en-US" dirty="0"/>
+              <a:t>More accurate simulation</a:t>
+            </a:r>
+          </a:p>
+          <a:p>
+            <a:pPr lvl="1">
+              <a:lnSpc>
+                <a:spcPct val="150000"/>
+              </a:lnSpc>
+            </a:pPr>
+            <a:r>
+              <a:rPr lang="en-US" dirty="0"/>
+              <a:t>More precise spoofing attacks</a:t>
+            </a:r>
+          </a:p>
+          <a:p>
+            <a:pPr lvl="1">
+              <a:lnSpc>
+                <a:spcPct val="150000"/>
+              </a:lnSpc>
+            </a:pPr>
+            <a:r>
+              <a:rPr lang="en-US" dirty="0"/>
+              <a:t>Real flight data</a:t>
+            </a:r>
+          </a:p>
+          <a:p>
+            <a:pPr>
+              <a:lnSpc>
+                <a:spcPct val="150000"/>
+              </a:lnSpc>
+            </a:pPr>
+            <a:r>
+              <a:rPr lang="en-US" dirty="0"/>
+              <a:t>Try unsupervised learning approaches</a:t>
+            </a:r>
+          </a:p>
+        </p:txBody>
+      </p:sp>
+    </p:spTree>
+    <p:extLst>
+      <p:ext uri="{BB962C8B-B14F-4D97-AF65-F5344CB8AC3E}">
+        <p14:creationId xmlns:p14="http://schemas.microsoft.com/office/powerpoint/2010/main" val="294100618"/>
       </p:ext>
     </p:extLst>
   </p:cSld>
@@ -4479,4 +6137,299 @@
     </a:ext>
   </a:extLst>
 </a:theme>
+</file>
+
+<file path=ppt/theme/theme2.xml><?xml version="1.0" encoding="utf-8"?>
+<a:theme xmlns:a="http://schemas.openxmlformats.org/drawingml/2006/main" name="Office Theme">
+  <a:themeElements>
+    <a:clrScheme name="Office">
+      <a:dk1>
+        <a:sysClr val="windowText" lastClr="000000"/>
+      </a:dk1>
+      <a:lt1>
+        <a:sysClr val="window" lastClr="FFFFFF"/>
+      </a:lt1>
+      <a:dk2>
+        <a:srgbClr val="44546A"/>
+      </a:dk2>
+      <a:lt2>
+        <a:srgbClr val="E7E6E6"/>
+      </a:lt2>
+      <a:accent1>
+        <a:srgbClr val="4472C4"/>
+      </a:accent1>
+      <a:accent2>
+        <a:srgbClr val="ED7D31"/>
+      </a:accent2>
+      <a:accent3>
+        <a:srgbClr val="A5A5A5"/>
+      </a:accent3>
+      <a:accent4>
+        <a:srgbClr val="FFC000"/>
+      </a:accent4>
+      <a:accent5>
+        <a:srgbClr val="5B9BD5"/>
+      </a:accent5>
+      <a:accent6>
+        <a:srgbClr val="70AD47"/>
+      </a:accent6>
+      <a:hlink>
+        <a:srgbClr val="0563C1"/>
+      </a:hlink>
+      <a:folHlink>
+        <a:srgbClr val="954F72"/>
+      </a:folHlink>
+    </a:clrScheme>
+    <a:fontScheme name="Office">
+      <a:majorFont>
+        <a:latin typeface="Calibri Light" panose="020F0302020204030204"/>
+        <a:ea typeface=""/>
+        <a:cs typeface=""/>
+        <a:font script="Jpan" typeface="游ゴシック Light"/>
+        <a:font script="Hang" typeface="맑은 고딕"/>
+        <a:font script="Hans" typeface="等线 Light"/>
+        <a:font script="Hant" typeface="新細明體"/>
+        <a:font script="Arab" typeface="Times New Roman"/>
+        <a:font script="Hebr" typeface="Times New Roman"/>
+        <a:font script="Thai" typeface="Angsana New"/>
+        <a:font script="Ethi" typeface="Nyala"/>
+        <a:font script="Beng" typeface="Vrinda"/>
+        <a:font script="Gujr" typeface="Shruti"/>
+        <a:font script="Khmr" typeface="MoolBoran"/>
+        <a:font script="Knda" typeface="Tunga"/>
+        <a:font script="Guru" typeface="Raavi"/>
+        <a:font script="Cans" typeface="Euphemia"/>
+        <a:font script="Cher" typeface="Plantagenet Cherokee"/>
+        <a:font script="Yiii" typeface="Microsoft Yi Baiti"/>
+        <a:font script="Tibt" typeface="Microsoft Himalaya"/>
+        <a:font script="Thaa" typeface="MV Boli"/>
+        <a:font script="Deva" typeface="Mangal"/>
+        <a:font script="Telu" typeface="Gautami"/>
+        <a:font script="Taml" typeface="Latha"/>
+        <a:font script="Syrc" typeface="Estrangelo Edessa"/>
+        <a:font script="Orya" typeface="Kalinga"/>
+        <a:font script="Mlym" typeface="Kartika"/>
+        <a:font script="Laoo" typeface="DokChampa"/>
+        <a:font script="Sinh" typeface="Iskoola Pota"/>
+        <a:font script="Mong" typeface="Mongolian Baiti"/>
+        <a:font script="Viet" typeface="Times New Roman"/>
+        <a:font script="Uigh" typeface="Microsoft Uighur"/>
+        <a:font script="Geor" typeface="Sylfaen"/>
+        <a:font script="Armn" typeface="Arial"/>
+        <a:font script="Bugi" typeface="Leelawadee UI"/>
+        <a:font script="Bopo" typeface="Microsoft JhengHei"/>
+        <a:font script="Java" typeface="Javanese Text"/>
+        <a:font script="Lisu" typeface="Segoe UI"/>
+        <a:font script="Mymr" typeface="Myanmar Text"/>
+        <a:font script="Nkoo" typeface="Ebrima"/>
+        <a:font script="Olck" typeface="Nirmala UI"/>
+        <a:font script="Osma" typeface="Ebrima"/>
+        <a:font script="Phag" typeface="Phagspa"/>
+        <a:font script="Syrn" typeface="Estrangelo Edessa"/>
+        <a:font script="Syrj" typeface="Estrangelo Edessa"/>
+        <a:font script="Syre" typeface="Estrangelo Edessa"/>
+        <a:font script="Sora" typeface="Nirmala UI"/>
+        <a:font script="Tale" typeface="Microsoft Tai Le"/>
+        <a:font script="Talu" typeface="Microsoft New Tai Lue"/>
+        <a:font script="Tfng" typeface="Ebrima"/>
+      </a:majorFont>
+      <a:minorFont>
+        <a:latin typeface="Calibri" panose="020F0502020204030204"/>
+        <a:ea typeface=""/>
+        <a:cs typeface=""/>
+        <a:font script="Jpan" typeface="游ゴシック"/>
+        <a:font script="Hang" typeface="맑은 고딕"/>
+        <a:font script="Hans" typeface="等线"/>
+        <a:font script="Hant" typeface="新細明體"/>
+        <a:font script="Arab" typeface="Arial"/>
+        <a:font script="Hebr" typeface="Arial"/>
+        <a:font script="Thai" typeface="Cordia New"/>
+        <a:font script="Ethi" typeface="Nyala"/>
+        <a:font script="Beng" typeface="Vrinda"/>
+        <a:font script="Gujr" typeface="Shruti"/>
+        <a:font script="Khmr" typeface="DaunPenh"/>
+        <a:font script="Knda" typeface="Tunga"/>
+        <a:font script="Guru" typeface="Raavi"/>
+        <a:font script="Cans" typeface="Euphemia"/>
+        <a:font script="Cher" typeface="Plantagenet Cherokee"/>
+        <a:font script="Yiii" typeface="Microsoft Yi Baiti"/>
+        <a:font script="Tibt" typeface="Microsoft Himalaya"/>
+        <a:font script="Thaa" typeface="MV Boli"/>
+        <a:font script="Deva" typeface="Mangal"/>
+        <a:font script="Telu" typeface="Gautami"/>
+        <a:font script="Taml" typeface="Latha"/>
+        <a:font script="Syrc" typeface="Estrangelo Edessa"/>
+        <a:font script="Orya" typeface="Kalinga"/>
+        <a:font script="Mlym" typeface="Kartika"/>
+        <a:font script="Laoo" typeface="DokChampa"/>
+        <a:font script="Sinh" typeface="Iskoola Pota"/>
+        <a:font script="Mong" typeface="Mongolian Baiti"/>
+        <a:font script="Viet" typeface="Arial"/>
+        <a:font script="Uigh" typeface="Microsoft Uighur"/>
+        <a:font script="Geor" typeface="Sylfaen"/>
+        <a:font script="Armn" typeface="Arial"/>
+        <a:font script="Bugi" typeface="Leelawadee UI"/>
+        <a:font script="Bopo" typeface="Microsoft JhengHei"/>
+        <a:font script="Java" typeface="Javanese Text"/>
+        <a:font script="Lisu" typeface="Segoe UI"/>
+        <a:font script="Mymr" typeface="Myanmar Text"/>
+        <a:font script="Nkoo" typeface="Ebrima"/>
+        <a:font script="Olck" typeface="Nirmala UI"/>
+        <a:font script="Osma" typeface="Ebrima"/>
+        <a:font script="Phag" typeface="Phagspa"/>
+        <a:font script="Syrn" typeface="Estrangelo Edessa"/>
+        <a:font script="Syrj" typeface="Estrangelo Edessa"/>
+        <a:font script="Syre" typeface="Estrangelo Edessa"/>
+        <a:font script="Sora" typeface="Nirmala UI"/>
+        <a:font script="Tale" typeface="Microsoft Tai Le"/>
+        <a:font script="Talu" typeface="Microsoft New Tai Lue"/>
+        <a:font script="Tfng" typeface="Ebrima"/>
+      </a:minorFont>
+    </a:fontScheme>
+    <a:fmtScheme name="Office">
+      <a:fillStyleLst>
+        <a:solidFill>
+          <a:schemeClr val="phClr"/>
+        </a:solidFill>
+        <a:gradFill rotWithShape="1">
+          <a:gsLst>
+            <a:gs pos="0">
+              <a:schemeClr val="phClr">
+                <a:lumMod val="110000"/>
+                <a:satMod val="105000"/>
+                <a:tint val="67000"/>
+              </a:schemeClr>
+            </a:gs>
+            <a:gs pos="50000">
+              <a:schemeClr val="phClr">
+                <a:lumMod val="105000"/>
+                <a:satMod val="103000"/>
+                <a:tint val="73000"/>
+              </a:schemeClr>
+            </a:gs>
+            <a:gs pos="100000">
+              <a:schemeClr val="phClr">
+                <a:lumMod val="105000"/>
+                <a:satMod val="109000"/>
+                <a:tint val="81000"/>
+              </a:schemeClr>
+            </a:gs>
+          </a:gsLst>
+          <a:lin ang="5400000" scaled="0"/>
+        </a:gradFill>
+        <a:gradFill rotWithShape="1">
+          <a:gsLst>
+            <a:gs pos="0">
+              <a:schemeClr val="phClr">
+                <a:satMod val="103000"/>
+                <a:lumMod val="102000"/>
+                <a:tint val="94000"/>
+              </a:schemeClr>
+            </a:gs>
+            <a:gs pos="50000">
+              <a:schemeClr val="phClr">
+                <a:satMod val="110000"/>
+                <a:lumMod val="100000"/>
+                <a:shade val="100000"/>
+              </a:schemeClr>
+            </a:gs>
+            <a:gs pos="100000">
+              <a:schemeClr val="phClr">
+                <a:lumMod val="99000"/>
+                <a:satMod val="120000"/>
+                <a:shade val="78000"/>
+              </a:schemeClr>
+            </a:gs>
+          </a:gsLst>
+          <a:lin ang="5400000" scaled="0"/>
+        </a:gradFill>
+      </a:fillStyleLst>
+      <a:lnStyleLst>
+        <a:ln w="6350" cap="flat" cmpd="sng" algn="ctr">
+          <a:solidFill>
+            <a:schemeClr val="phClr"/>
+          </a:solidFill>
+          <a:prstDash val="solid"/>
+          <a:miter lim="800000"/>
+        </a:ln>
+        <a:ln w="12700" cap="flat" cmpd="sng" algn="ctr">
+          <a:solidFill>
+            <a:schemeClr val="phClr"/>
+          </a:solidFill>
+          <a:prstDash val="solid"/>
+          <a:miter lim="800000"/>
+        </a:ln>
+        <a:ln w="19050" cap="flat" cmpd="sng" algn="ctr">
+          <a:solidFill>
+            <a:schemeClr val="phClr"/>
+          </a:solidFill>
+          <a:prstDash val="solid"/>
+          <a:miter lim="800000"/>
+        </a:ln>
+      </a:lnStyleLst>
+      <a:effectStyleLst>
+        <a:effectStyle>
+          <a:effectLst/>
+        </a:effectStyle>
+        <a:effectStyle>
+          <a:effectLst/>
+        </a:effectStyle>
+        <a:effectStyle>
+          <a:effectLst>
+            <a:outerShdw blurRad="57150" dist="19050" dir="5400000" algn="ctr" rotWithShape="0">
+              <a:srgbClr val="000000">
+                <a:alpha val="63000"/>
+              </a:srgbClr>
+            </a:outerShdw>
+          </a:effectLst>
+        </a:effectStyle>
+      </a:effectStyleLst>
+      <a:bgFillStyleLst>
+        <a:solidFill>
+          <a:schemeClr val="phClr"/>
+        </a:solidFill>
+        <a:solidFill>
+          <a:schemeClr val="phClr">
+            <a:tint val="95000"/>
+            <a:satMod val="170000"/>
+          </a:schemeClr>
+        </a:solidFill>
+        <a:gradFill rotWithShape="1">
+          <a:gsLst>
+            <a:gs pos="0">
+              <a:schemeClr val="phClr">
+                <a:tint val="93000"/>
+                <a:satMod val="150000"/>
+                <a:shade val="98000"/>
+                <a:lumMod val="102000"/>
+              </a:schemeClr>
+            </a:gs>
+            <a:gs pos="50000">
+              <a:schemeClr val="phClr">
+                <a:tint val="98000"/>
+                <a:satMod val="130000"/>
+                <a:shade val="90000"/>
+                <a:lumMod val="103000"/>
+              </a:schemeClr>
+            </a:gs>
+            <a:gs pos="100000">
+              <a:schemeClr val="phClr">
+                <a:shade val="63000"/>
+                <a:satMod val="120000"/>
+              </a:schemeClr>
+            </a:gs>
+          </a:gsLst>
+          <a:lin ang="5400000" scaled="0"/>
+        </a:gradFill>
+      </a:bgFillStyleLst>
+    </a:fmtScheme>
+  </a:themeElements>
+  <a:objectDefaults/>
+  <a:extraClrSchemeLst/>
+  <a:extLst>
+    <a:ext uri="{05A4C25C-085E-4340-85A3-A5531E510DB2}">
+      <thm15:themeFamily xmlns:thm15="http://schemas.microsoft.com/office/thememl/2012/main" name="Office Theme" id="{62F939B6-93AF-4DB8-9C6B-D6C7DFDC589F}" vid="{4A3C46E8-61CC-4603-A589-7422A47A8E4A}"/>
+    </a:ext>
+  </a:extLst>
+</a:theme>
 </file>
</xml_diff>